<commit_message>
Fixed broken images in ggplot12 slides
</commit_message>
<xml_diff>
--- a/lectures/02-ggplot2-crash-course.pptx
+++ b/lectures/02-ggplot2-crash-course.pptx
@@ -6279,9 +6279,84 @@
           </a:p>
         </p:txBody>
       </p:sp>
+      <p:sp>
+        <p:nvSpPr>
+          <p:cNvPr id="6" name="TextBox 5"/>
+          <p:cNvSpPr txBox="1"/>
+          <p:nvPr/>
+        </p:nvSpPr>
+        <p:spPr>
+          <a:xfrm>
+            <a:off x="2504519" y="5007114"/>
+            <a:ext cx="4185761" cy="707886"/>
+          </a:xfrm>
+          <a:prstGeom prst="rect">
+            <a:avLst/>
+          </a:prstGeom>
+          <a:noFill/>
+        </p:spPr>
+        <p:txBody>
+          <a:bodyPr wrap="none" rtlCol="0">
+            <a:spAutoFit/>
+          </a:bodyPr>
+          <a:lstStyle/>
+          <a:p>
+            <a:r>
+              <a:rPr lang="en-US" sz="4000" dirty="0" err="1">
+                <a:solidFill>
+                  <a:srgbClr val="003470"/>
+                </a:solidFill>
+                <a:latin typeface="Courier" charset="0"/>
+                <a:ea typeface="Courier" charset="0"/>
+                <a:cs typeface="Courier" charset="0"/>
+              </a:rPr>
+              <a:t>geoms</a:t>
+            </a:r>
+            <a:r>
+              <a:rPr lang="en-US" sz="4000" dirty="0">
+                <a:solidFill>
+                  <a:srgbClr val="003470"/>
+                </a:solidFill>
+                <a:latin typeface="Courier" charset="0"/>
+                <a:ea typeface="Courier" charset="0"/>
+                <a:cs typeface="Courier" charset="0"/>
+              </a:rPr>
+              <a:t> + </a:t>
+            </a:r>
+            <a:r>
+              <a:rPr lang="en-US" sz="4000" dirty="0" err="1">
+                <a:solidFill>
+                  <a:srgbClr val="003470"/>
+                </a:solidFill>
+                <a:latin typeface="Courier" charset="0"/>
+                <a:ea typeface="Courier" charset="0"/>
+                <a:cs typeface="Courier" charset="0"/>
+              </a:rPr>
+              <a:t>aes</a:t>
+            </a:r>
+            <a:r>
+              <a:rPr lang="en-US" sz="4000" dirty="0">
+                <a:solidFill>
+                  <a:srgbClr val="003470"/>
+                </a:solidFill>
+                <a:latin typeface="Courier" charset="0"/>
+                <a:ea typeface="Courier" charset="0"/>
+                <a:cs typeface="Courier" charset="0"/>
+              </a:rPr>
+              <a:t>()</a:t>
+            </a:r>
+          </a:p>
+        </p:txBody>
+      </p:sp>
       <p:pic>
         <p:nvPicPr>
-          <p:cNvPr id="4" name="Picture 3"/>
+          <p:cNvPr id="3" name="Picture 2">
+            <a:extLst>
+              <a:ext uri="{FF2B5EF4-FFF2-40B4-BE49-F238E27FC236}">
+                <a16:creationId xmlns:a16="http://schemas.microsoft.com/office/drawing/2014/main" id="{2BC2B92B-CC22-CB41-AD06-90DE3B18E698}"/>
+              </a:ext>
+            </a:extLst>
+          </p:cNvPr>
           <p:cNvPicPr>
             <a:picLocks noChangeAspect="1"/>
           </p:cNvPicPr>
@@ -6295,83 +6370,14 @@
         </p:blipFill>
         <p:spPr>
           <a:xfrm>
-            <a:off x="3429000" y="2057400"/>
-            <a:ext cx="2336800" cy="2628900"/>
+            <a:off x="228600" y="1725705"/>
+            <a:ext cx="8458200" cy="3316941"/>
           </a:xfrm>
           <a:prstGeom prst="rect">
             <a:avLst/>
           </a:prstGeom>
         </p:spPr>
       </p:pic>
-      <p:sp>
-        <p:nvSpPr>
-          <p:cNvPr id="6" name="TextBox 5"/>
-          <p:cNvSpPr txBox="1"/>
-          <p:nvPr/>
-        </p:nvSpPr>
-        <p:spPr>
-          <a:xfrm>
-            <a:off x="2504519" y="4686300"/>
-            <a:ext cx="4185761" cy="707886"/>
-          </a:xfrm>
-          <a:prstGeom prst="rect">
-            <a:avLst/>
-          </a:prstGeom>
-          <a:noFill/>
-        </p:spPr>
-        <p:txBody>
-          <a:bodyPr wrap="none" rtlCol="0">
-            <a:spAutoFit/>
-          </a:bodyPr>
-          <a:lstStyle/>
-          <a:p>
-            <a:r>
-              <a:rPr lang="en-US" sz="4000" dirty="0" err="1">
-                <a:solidFill>
-                  <a:srgbClr val="003470"/>
-                </a:solidFill>
-                <a:latin typeface="Courier" charset="0"/>
-                <a:ea typeface="Courier" charset="0"/>
-                <a:cs typeface="Courier" charset="0"/>
-              </a:rPr>
-              <a:t>geoms</a:t>
-            </a:r>
-            <a:r>
-              <a:rPr lang="en-US" sz="4000" dirty="0">
-                <a:solidFill>
-                  <a:srgbClr val="003470"/>
-                </a:solidFill>
-                <a:latin typeface="Courier" charset="0"/>
-                <a:ea typeface="Courier" charset="0"/>
-                <a:cs typeface="Courier" charset="0"/>
-              </a:rPr>
-              <a:t> + </a:t>
-            </a:r>
-            <a:r>
-              <a:rPr lang="en-US" sz="4000" dirty="0" err="1">
-                <a:solidFill>
-                  <a:srgbClr val="003470"/>
-                </a:solidFill>
-                <a:latin typeface="Courier" charset="0"/>
-                <a:ea typeface="Courier" charset="0"/>
-                <a:cs typeface="Courier" charset="0"/>
-              </a:rPr>
-              <a:t>aes</a:t>
-            </a:r>
-            <a:r>
-              <a:rPr lang="en-US" sz="4000" dirty="0">
-                <a:solidFill>
-                  <a:srgbClr val="003470"/>
-                </a:solidFill>
-                <a:latin typeface="Courier" charset="0"/>
-                <a:ea typeface="Courier" charset="0"/>
-                <a:cs typeface="Courier" charset="0"/>
-              </a:rPr>
-              <a:t>()</a:t>
-            </a:r>
-          </a:p>
-        </p:txBody>
-      </p:sp>
     </p:spTree>
     <p:extLst>
       <p:ext uri="{BB962C8B-B14F-4D97-AF65-F5344CB8AC3E}">
@@ -6434,8 +6440,19 @@
                 <a:ea typeface="Courier" charset="0"/>
                 <a:cs typeface="Courier" charset="0"/>
               </a:rPr>
-              <a:t> refresher</a:t>
-            </a:r>
+              <a:t> </a:t>
+            </a:r>
+            <a:r>
+              <a:rPr lang="en-US">
+                <a:ea typeface="Courier" charset="0"/>
+                <a:cs typeface="Courier" charset="0"/>
+              </a:rPr>
+              <a:t>crash course</a:t>
+            </a:r>
+            <a:endParaRPr lang="en-US" dirty="0">
+              <a:ea typeface="Courier" charset="0"/>
+              <a:cs typeface="Courier" charset="0"/>
+            </a:endParaRPr>
           </a:p>
         </p:txBody>
       </p:sp>
@@ -6457,14 +6474,13 @@
               </a:ext>
             </a:extLst>
           </a:blip>
-          <a:stretch>
-            <a:fillRect/>
-          </a:stretch>
+          <a:srcRect/>
+          <a:stretch/>
         </p:blipFill>
         <p:spPr>
           <a:xfrm>
-            <a:off x="304800" y="1450649"/>
-            <a:ext cx="8607624" cy="5223466"/>
+            <a:off x="270896" y="990600"/>
+            <a:ext cx="8671086" cy="5683515"/>
           </a:xfrm>
         </p:spPr>
       </p:pic>

</xml_diff>

<commit_message>
Day 1 2021 updates
</commit_message>
<xml_diff>
--- a/lectures/02-ggplot2-crash-course.pptx
+++ b/lectures/02-ggplot2-crash-course.pptx
@@ -216,7 +216,7 @@
             <a:fld id="{6F801F3F-85FD-4D6D-9902-DE21320E0477}" type="datetimeFigureOut">
               <a:rPr lang="en-US" smtClean="0"/>
               <a:pPr/>
-              <a:t>7/6/20</a:t>
+              <a:t>6/28/21</a:t>
             </a:fld>
             <a:endParaRPr lang="en-US"/>
           </a:p>
@@ -760,7 +760,7 @@
             <a:fld id="{104E1C1F-C217-4AD6-AF7C-55411A2E8AB0}" type="datetimeFigureOut">
               <a:rPr lang="en-US" smtClean="0"/>
               <a:pPr/>
-              <a:t>7/6/20</a:t>
+              <a:t>6/28/21</a:t>
             </a:fld>
             <a:endParaRPr lang="en-US"/>
           </a:p>
@@ -960,7 +960,7 @@
             <a:fld id="{104E1C1F-C217-4AD6-AF7C-55411A2E8AB0}" type="datetimeFigureOut">
               <a:rPr lang="en-US" smtClean="0"/>
               <a:pPr/>
-              <a:t>7/6/20</a:t>
+              <a:t>6/28/21</a:t>
             </a:fld>
             <a:endParaRPr lang="en-US"/>
           </a:p>
@@ -1137,7 +1137,7 @@
             <a:fld id="{104E1C1F-C217-4AD6-AF7C-55411A2E8AB0}" type="datetimeFigureOut">
               <a:rPr lang="en-US" smtClean="0"/>
               <a:pPr/>
-              <a:t>7/6/20</a:t>
+              <a:t>6/28/21</a:t>
             </a:fld>
             <a:endParaRPr lang="en-US"/>
           </a:p>
@@ -1309,7 +1309,7 @@
             <a:fld id="{104E1C1F-C217-4AD6-AF7C-55411A2E8AB0}" type="datetimeFigureOut">
               <a:rPr lang="en-US" smtClean="0"/>
               <a:pPr/>
-              <a:t>7/6/20</a:t>
+              <a:t>6/28/21</a:t>
             </a:fld>
             <a:endParaRPr lang="en-US"/>
           </a:p>
@@ -1559,7 +1559,7 @@
             <a:fld id="{104E1C1F-C217-4AD6-AF7C-55411A2E8AB0}" type="datetimeFigureOut">
               <a:rPr lang="en-US" smtClean="0"/>
               <a:pPr/>
-              <a:t>7/6/20</a:t>
+              <a:t>6/28/21</a:t>
             </a:fld>
             <a:endParaRPr lang="en-US"/>
           </a:p>
@@ -1877,7 +1877,7 @@
             <a:fld id="{104E1C1F-C217-4AD6-AF7C-55411A2E8AB0}" type="datetimeFigureOut">
               <a:rPr lang="en-US" smtClean="0"/>
               <a:pPr/>
-              <a:t>7/6/20</a:t>
+              <a:t>6/28/21</a:t>
             </a:fld>
             <a:endParaRPr lang="en-US"/>
           </a:p>
@@ -2345,7 +2345,7 @@
             <a:fld id="{104E1C1F-C217-4AD6-AF7C-55411A2E8AB0}" type="datetimeFigureOut">
               <a:rPr lang="en-US" smtClean="0"/>
               <a:pPr/>
-              <a:t>7/6/20</a:t>
+              <a:t>6/28/21</a:t>
             </a:fld>
             <a:endParaRPr lang="en-US"/>
           </a:p>
@@ -2494,7 +2494,7 @@
             <a:fld id="{104E1C1F-C217-4AD6-AF7C-55411A2E8AB0}" type="datetimeFigureOut">
               <a:rPr lang="en-US" smtClean="0"/>
               <a:pPr/>
-              <a:t>7/6/20</a:t>
+              <a:t>6/28/21</a:t>
             </a:fld>
             <a:endParaRPr lang="en-US"/>
           </a:p>
@@ -2586,7 +2586,7 @@
             <a:fld id="{104E1C1F-C217-4AD6-AF7C-55411A2E8AB0}" type="datetimeFigureOut">
               <a:rPr lang="en-US" smtClean="0"/>
               <a:pPr/>
-              <a:t>7/6/20</a:t>
+              <a:t>6/28/21</a:t>
             </a:fld>
             <a:endParaRPr lang="en-US"/>
           </a:p>
@@ -2862,7 +2862,7 @@
             <a:fld id="{104E1C1F-C217-4AD6-AF7C-55411A2E8AB0}" type="datetimeFigureOut">
               <a:rPr lang="en-US" smtClean="0"/>
               <a:pPr/>
-              <a:t>7/6/20</a:t>
+              <a:t>6/28/21</a:t>
             </a:fld>
             <a:endParaRPr lang="en-US"/>
           </a:p>
@@ -3169,7 +3169,7 @@
             <a:fld id="{104E1C1F-C217-4AD6-AF7C-55411A2E8AB0}" type="datetimeFigureOut">
               <a:rPr lang="en-US" smtClean="0"/>
               <a:pPr/>
-              <a:t>7/6/20</a:t>
+              <a:t>6/28/21</a:t>
             </a:fld>
             <a:endParaRPr lang="en-US"/>
           </a:p>
@@ -3467,7 +3467,7 @@
             <a:fld id="{104E1C1F-C217-4AD6-AF7C-55411A2E8AB0}" type="datetimeFigureOut">
               <a:rPr lang="en-US" smtClean="0"/>
               <a:pPr/>
-              <a:t>7/6/20</a:t>
+              <a:t>6/28/21</a:t>
             </a:fld>
             <a:endParaRPr lang="en-US"/>
           </a:p>
@@ -3882,7 +3882,7 @@
           <a:p>
             <a:r>
               <a:rPr lang="en-US" sz="2400" cap="none" dirty="0"/>
-              <a:t>MassMutual DSDP/DEDP 2020: </a:t>
+              <a:t>MassMutual DSDP 2021: </a:t>
             </a:r>
             <a:br>
               <a:rPr lang="en-US" dirty="0"/>
@@ -3926,24 +3926,19 @@
           <a:p>
             <a:r>
               <a:rPr lang="en-US" dirty="0"/>
-              <a:t>July 6, 2020</a:t>
+              <a:t>June 28, 2021</a:t>
             </a:r>
           </a:p>
           <a:p>
             <a:r>
               <a:rPr lang="en-US" dirty="0"/>
-              <a:t>R. Jordan </a:t>
-            </a:r>
-            <a:r>
-              <a:rPr lang="en-US" dirty="0" err="1"/>
-              <a:t>Crouser</a:t>
-            </a:r>
-            <a:endParaRPr lang="en-US" dirty="0"/>
+              <a:t>R. Jordan Crouser</a:t>
+            </a:r>
           </a:p>
           <a:p>
             <a:r>
               <a:rPr lang="en-US" dirty="0"/>
-              <a:t>Assistant Professor of Computer Science</a:t>
+              <a:t>Associate Professor of Computer Science</a:t>
             </a:r>
           </a:p>
           <a:p>

</xml_diff>